<commit_message>
Created levels up to 200
Created Pyton script to help sorting new level when cloning existing level config
</commit_message>
<xml_diff>
--- a/title.pptx
+++ b/title.pptx
@@ -263,7 +263,7 @@
           <a:p>
             <a:fld id="{AE8FB4D4-C118-45F4-8C1A-A2DFB70A21FE}" type="datetimeFigureOut">
               <a:rPr lang="en-GB" smtClean="0"/>
-              <a:t>19/02/2023</a:t>
+              <a:t>07/08/2023</a:t>
             </a:fld>
             <a:endParaRPr lang="en-GB"/>
           </a:p>
@@ -463,7 +463,7 @@
           <a:p>
             <a:fld id="{AE8FB4D4-C118-45F4-8C1A-A2DFB70A21FE}" type="datetimeFigureOut">
               <a:rPr lang="en-GB" smtClean="0"/>
-              <a:t>19/02/2023</a:t>
+              <a:t>07/08/2023</a:t>
             </a:fld>
             <a:endParaRPr lang="en-GB"/>
           </a:p>
@@ -673,7 +673,7 @@
           <a:p>
             <a:fld id="{AE8FB4D4-C118-45F4-8C1A-A2DFB70A21FE}" type="datetimeFigureOut">
               <a:rPr lang="en-GB" smtClean="0"/>
-              <a:t>19/02/2023</a:t>
+              <a:t>07/08/2023</a:t>
             </a:fld>
             <a:endParaRPr lang="en-GB"/>
           </a:p>
@@ -873,7 +873,7 @@
           <a:p>
             <a:fld id="{AE8FB4D4-C118-45F4-8C1A-A2DFB70A21FE}" type="datetimeFigureOut">
               <a:rPr lang="en-GB" smtClean="0"/>
-              <a:t>19/02/2023</a:t>
+              <a:t>07/08/2023</a:t>
             </a:fld>
             <a:endParaRPr lang="en-GB"/>
           </a:p>
@@ -1149,7 +1149,7 @@
           <a:p>
             <a:fld id="{AE8FB4D4-C118-45F4-8C1A-A2DFB70A21FE}" type="datetimeFigureOut">
               <a:rPr lang="en-GB" smtClean="0"/>
-              <a:t>19/02/2023</a:t>
+              <a:t>07/08/2023</a:t>
             </a:fld>
             <a:endParaRPr lang="en-GB"/>
           </a:p>
@@ -1417,7 +1417,7 @@
           <a:p>
             <a:fld id="{AE8FB4D4-C118-45F4-8C1A-A2DFB70A21FE}" type="datetimeFigureOut">
               <a:rPr lang="en-GB" smtClean="0"/>
-              <a:t>19/02/2023</a:t>
+              <a:t>07/08/2023</a:t>
             </a:fld>
             <a:endParaRPr lang="en-GB"/>
           </a:p>
@@ -1832,7 +1832,7 @@
           <a:p>
             <a:fld id="{AE8FB4D4-C118-45F4-8C1A-A2DFB70A21FE}" type="datetimeFigureOut">
               <a:rPr lang="en-GB" smtClean="0"/>
-              <a:t>19/02/2023</a:t>
+              <a:t>07/08/2023</a:t>
             </a:fld>
             <a:endParaRPr lang="en-GB"/>
           </a:p>
@@ -1974,7 +1974,7 @@
           <a:p>
             <a:fld id="{AE8FB4D4-C118-45F4-8C1A-A2DFB70A21FE}" type="datetimeFigureOut">
               <a:rPr lang="en-GB" smtClean="0"/>
-              <a:t>19/02/2023</a:t>
+              <a:t>07/08/2023</a:t>
             </a:fld>
             <a:endParaRPr lang="en-GB"/>
           </a:p>
@@ -2087,7 +2087,7 @@
           <a:p>
             <a:fld id="{AE8FB4D4-C118-45F4-8C1A-A2DFB70A21FE}" type="datetimeFigureOut">
               <a:rPr lang="en-GB" smtClean="0"/>
-              <a:t>19/02/2023</a:t>
+              <a:t>07/08/2023</a:t>
             </a:fld>
             <a:endParaRPr lang="en-GB"/>
           </a:p>
@@ -2400,7 +2400,7 @@
           <a:p>
             <a:fld id="{AE8FB4D4-C118-45F4-8C1A-A2DFB70A21FE}" type="datetimeFigureOut">
               <a:rPr lang="en-GB" smtClean="0"/>
-              <a:t>19/02/2023</a:t>
+              <a:t>07/08/2023</a:t>
             </a:fld>
             <a:endParaRPr lang="en-GB"/>
           </a:p>
@@ -2689,7 +2689,7 @@
           <a:p>
             <a:fld id="{AE8FB4D4-C118-45F4-8C1A-A2DFB70A21FE}" type="datetimeFigureOut">
               <a:rPr lang="en-GB" smtClean="0"/>
-              <a:t>19/02/2023</a:t>
+              <a:t>07/08/2023</a:t>
             </a:fld>
             <a:endParaRPr lang="en-GB"/>
           </a:p>
@@ -2932,7 +2932,7 @@
           <a:p>
             <a:fld id="{AE8FB4D4-C118-45F4-8C1A-A2DFB70A21FE}" type="datetimeFigureOut">
               <a:rPr lang="en-GB" smtClean="0"/>
-              <a:t>19/02/2023</a:t>
+              <a:t>07/08/2023</a:t>
             </a:fld>
             <a:endParaRPr lang="en-GB"/>
           </a:p>
@@ -4107,6 +4107,141 @@
           </a:prstGeom>
         </p:spPr>
       </p:pic>
+      <p:pic>
+        <p:nvPicPr>
+          <p:cNvPr id="6" name="Graphic 5" descr="Checkmark with solid fill">
+            <a:extLst>
+              <a:ext uri="{FF2B5EF4-FFF2-40B4-BE49-F238E27FC236}">
+                <a16:creationId xmlns:a16="http://schemas.microsoft.com/office/drawing/2014/main" id="{545BD273-577F-3703-F7A1-18467EDA0E53}"/>
+              </a:ext>
+            </a:extLst>
+          </p:cNvPr>
+          <p:cNvPicPr>
+            <a:picLocks noChangeAspect="1"/>
+          </p:cNvPicPr>
+          <p:nvPr/>
+        </p:nvPicPr>
+        <p:blipFill>
+          <a:blip r:embed="rId4">
+            <a:extLst>
+              <a:ext uri="{28A0092B-C50C-407E-A947-70E740481C1C}">
+                <a14:useLocalDpi xmlns:a14="http://schemas.microsoft.com/office/drawing/2010/main" val="0"/>
+              </a:ext>
+              <a:ext uri="{96DAC541-7B7A-43D3-8B79-37D633B846F1}">
+                <asvg:svgBlip xmlns:asvg="http://schemas.microsoft.com/office/drawing/2016/SVG/main" r:embed="rId5"/>
+              </a:ext>
+            </a:extLst>
+          </a:blip>
+          <a:stretch>
+            <a:fillRect/>
+          </a:stretch>
+        </p:blipFill>
+        <p:spPr>
+          <a:xfrm>
+            <a:off x="3140748" y="866402"/>
+            <a:ext cx="914400" cy="914400"/>
+          </a:xfrm>
+          <a:prstGeom prst="rect">
+            <a:avLst/>
+          </a:prstGeom>
+        </p:spPr>
+      </p:pic>
+      <p:pic>
+        <p:nvPicPr>
+          <p:cNvPr id="8" name="Graphic 7" descr="Checkmark outline">
+            <a:extLst>
+              <a:ext uri="{FF2B5EF4-FFF2-40B4-BE49-F238E27FC236}">
+                <a16:creationId xmlns:a16="http://schemas.microsoft.com/office/drawing/2014/main" id="{925F9A1F-FCE2-B1F3-1E7D-D0B0851A7E20}"/>
+              </a:ext>
+            </a:extLst>
+          </p:cNvPr>
+          <p:cNvPicPr>
+            <a:picLocks noChangeAspect="1"/>
+          </p:cNvPicPr>
+          <p:nvPr/>
+        </p:nvPicPr>
+        <p:blipFill>
+          <a:blip r:embed="rId6">
+            <a:extLst>
+              <a:ext uri="{28A0092B-C50C-407E-A947-70E740481C1C}">
+                <a14:useLocalDpi xmlns:a14="http://schemas.microsoft.com/office/drawing/2010/main" val="0"/>
+              </a:ext>
+              <a:ext uri="{96DAC541-7B7A-43D3-8B79-37D633B846F1}">
+                <asvg:svgBlip xmlns:asvg="http://schemas.microsoft.com/office/drawing/2016/SVG/main" r:embed="rId7"/>
+              </a:ext>
+            </a:extLst>
+          </a:blip>
+          <a:stretch>
+            <a:fillRect/>
+          </a:stretch>
+        </p:blipFill>
+        <p:spPr>
+          <a:xfrm>
+            <a:off x="3186992" y="713629"/>
+            <a:ext cx="914400" cy="914400"/>
+          </a:xfrm>
+          <a:prstGeom prst="rect">
+            <a:avLst/>
+          </a:prstGeom>
+        </p:spPr>
+      </p:pic>
+      <p:sp>
+        <p:nvSpPr>
+          <p:cNvPr id="52" name="L-Shape 51">
+            <a:extLst>
+              <a:ext uri="{FF2B5EF4-FFF2-40B4-BE49-F238E27FC236}">
+                <a16:creationId xmlns:a16="http://schemas.microsoft.com/office/drawing/2014/main" id="{DB3E44A1-3BA8-2608-968F-9021C243896E}"/>
+              </a:ext>
+            </a:extLst>
+          </p:cNvPr>
+          <p:cNvSpPr/>
+          <p:nvPr/>
+        </p:nvSpPr>
+        <p:spPr>
+          <a:xfrm rot="18895070">
+            <a:off x="6768054" y="689749"/>
+            <a:ext cx="2112121" cy="962160"/>
+          </a:xfrm>
+          <a:prstGeom prst="corner">
+            <a:avLst>
+              <a:gd name="adj1" fmla="val 38800"/>
+              <a:gd name="adj2" fmla="val 40702"/>
+            </a:avLst>
+          </a:prstGeom>
+          <a:solidFill>
+            <a:schemeClr val="bg1"/>
+          </a:solidFill>
+          <a:ln w="76200">
+            <a:solidFill>
+              <a:schemeClr val="tx1"/>
+            </a:solidFill>
+          </a:ln>
+        </p:spPr>
+        <p:style>
+          <a:lnRef idx="2">
+            <a:schemeClr val="accent1">
+              <a:shade val="15000"/>
+            </a:schemeClr>
+          </a:lnRef>
+          <a:fillRef idx="1">
+            <a:schemeClr val="accent1"/>
+          </a:fillRef>
+          <a:effectRef idx="0">
+            <a:schemeClr val="accent1"/>
+          </a:effectRef>
+          <a:fontRef idx="minor">
+            <a:schemeClr val="lt1"/>
+          </a:fontRef>
+        </p:style>
+        <p:txBody>
+          <a:bodyPr rtlCol="0" anchor="ctr"/>
+          <a:lstStyle/>
+          <a:p>
+            <a:pPr algn="ctr"/>
+            <a:endParaRPr lang="en-GB"/>
+          </a:p>
+        </p:txBody>
+      </p:sp>
     </p:spTree>
     <p:extLst>
       <p:ext uri="{BB962C8B-B14F-4D97-AF65-F5344CB8AC3E}">

</xml_diff>